<commit_message>
First version of serial interface
</commit_message>
<xml_diff>
--- a/Chip_controller.pptx
+++ b/Chip_controller.pptx
@@ -4675,6 +4675,93 @@
 </p:notes>
 </file>
 
+<file path=ppt/notesSlides/notesSlide14.xml><?xml version="1.0" encoding="utf-8"?>
+<p:notes xmlns:a="http://schemas.openxmlformats.org/drawingml/2006/main" xmlns:r="http://schemas.openxmlformats.org/officeDocument/2006/relationships" xmlns:p="http://schemas.openxmlformats.org/presentationml/2006/main">
+  <p:cSld>
+    <p:spTree>
+      <p:nvGrpSpPr>
+        <p:cNvPr id="1" name=""/>
+        <p:cNvGrpSpPr/>
+        <p:nvPr/>
+      </p:nvGrpSpPr>
+      <p:grpSpPr>
+        <a:xfrm>
+          <a:off x="0" y="0"/>
+          <a:ext cx="0" cy="0"/>
+          <a:chOff x="0" y="0"/>
+          <a:chExt cx="0" cy="0"/>
+        </a:xfrm>
+      </p:grpSpPr>
+      <p:sp>
+        <p:nvSpPr>
+          <p:cNvPr id="2" name="Symbol zastępczy obrazu slajdu 1"/>
+          <p:cNvSpPr>
+            <a:spLocks noGrp="1" noRot="1" noChangeAspect="1"/>
+          </p:cNvSpPr>
+          <p:nvPr>
+            <p:ph type="sldImg"/>
+          </p:nvPr>
+        </p:nvSpPr>
+        <p:spPr/>
+      </p:sp>
+      <p:sp>
+        <p:nvSpPr>
+          <p:cNvPr id="3" name="Symbol zastępczy notatek 2"/>
+          <p:cNvSpPr>
+            <a:spLocks noGrp="1"/>
+          </p:cNvSpPr>
+          <p:nvPr>
+            <p:ph type="body" idx="1"/>
+          </p:nvPr>
+        </p:nvSpPr>
+        <p:spPr/>
+        <p:txBody>
+          <a:bodyPr/>
+          <a:lstStyle/>
+          <a:p>
+            <a:r>
+              <a:rPr lang="pl-PL" dirty="0"/>
+              <a:t>https://github.com/StanislawMaciejewski/Chip_controller/tree/two_dim_array</a:t>
+            </a:r>
+          </a:p>
+        </p:txBody>
+      </p:sp>
+      <p:sp>
+        <p:nvSpPr>
+          <p:cNvPr id="4" name="Symbol zastępczy numeru slajdu 3"/>
+          <p:cNvSpPr>
+            <a:spLocks noGrp="1"/>
+          </p:cNvSpPr>
+          <p:nvPr>
+            <p:ph type="sldNum" sz="quarter" idx="5"/>
+          </p:nvPr>
+        </p:nvSpPr>
+        <p:spPr/>
+        <p:txBody>
+          <a:bodyPr/>
+          <a:lstStyle/>
+          <a:p>
+            <a:fld id="{2EC54D3C-C69F-4E6C-ABD7-CF0A850BB02E}" type="slidenum">
+              <a:rPr lang="pl-PL" smtClean="0"/>
+              <a:t>23</a:t>
+            </a:fld>
+            <a:endParaRPr lang="pl-PL"/>
+          </a:p>
+        </p:txBody>
+      </p:sp>
+    </p:spTree>
+    <p:extLst>
+      <p:ext uri="{BB962C8B-B14F-4D97-AF65-F5344CB8AC3E}">
+        <p14:creationId xmlns:p14="http://schemas.microsoft.com/office/powerpoint/2010/main" val="2040895525"/>
+      </p:ext>
+    </p:extLst>
+  </p:cSld>
+  <p:clrMapOvr>
+    <a:masterClrMapping/>
+  </p:clrMapOvr>
+</p:notes>
+</file>
+
 <file path=ppt/notesSlides/notesSlide2.xml><?xml version="1.0" encoding="utf-8"?>
 <p:notes xmlns:a="http://schemas.openxmlformats.org/drawingml/2006/main" xmlns:r="http://schemas.openxmlformats.org/officeDocument/2006/relationships" xmlns:p="http://schemas.openxmlformats.org/presentationml/2006/main">
   <p:cSld>
@@ -13414,14 +13501,14 @@
           </p:nvPr>
         </p:nvPicPr>
         <p:blipFill>
-          <a:blip r:embed="rId2"/>
+          <a:blip r:embed="rId3"/>
           <a:stretch>
             <a:fillRect/>
           </a:stretch>
         </p:blipFill>
         <p:spPr>
           <a:xfrm>
-            <a:off x="-11243" y="1678091"/>
+            <a:off x="-11243" y="437120"/>
             <a:ext cx="12203243" cy="2991880"/>
           </a:xfrm>
         </p:spPr>
@@ -16083,15 +16170,6 @@
 </file>
 
 <file path=customXml/item1.xml><?xml version="1.0" encoding="utf-8"?>
-<?mso-contentType ?>
-<FormTemplates xmlns="http://schemas.microsoft.com/sharepoint/v3/contenttype/forms">
-  <Display>DocumentLibraryForm</Display>
-  <Edit>DocumentLibraryForm</Edit>
-  <New>DocumentLibraryForm</New>
-</FormTemplates>
-</file>
-
-<file path=customXml/item2.xml><?xml version="1.0" encoding="utf-8"?>
 <ct:contentTypeSchema xmlns:ct="http://schemas.microsoft.com/office/2006/metadata/contentType" xmlns:ma="http://schemas.microsoft.com/office/2006/metadata/properties/metaAttributes" ct:_="" ma:_="" ma:contentTypeName="Dokument" ma:contentTypeID="0x010100769EEAFFF8050846B8921DC5A70925A7" ma:contentTypeVersion="3" ma:contentTypeDescription="Utwórz nowy dokument." ma:contentTypeScope="" ma:versionID="1f4082ff9506847b40a5a59f069eab22">
   <xsd:schema xmlns:xsd="http://www.w3.org/2001/XMLSchema" xmlns:xs="http://www.w3.org/2001/XMLSchema" xmlns:p="http://schemas.microsoft.com/office/2006/metadata/properties" xmlns:ns2="8f53f1b7-a1b3-4c57-bf3a-36b8131d8963" targetNamespace="http://schemas.microsoft.com/office/2006/metadata/properties" ma:root="true" ma:fieldsID="d189dd818bdf0938f0b5cbdf1b3b47c0" ns2:_="">
     <xsd:import namespace="8f53f1b7-a1b3-4c57-bf3a-36b8131d8963"/>
@@ -16229,6 +16307,15 @@
 </ct:contentTypeSchema>
 </file>
 
+<file path=customXml/item2.xml><?xml version="1.0" encoding="utf-8"?>
+<?mso-contentType ?>
+<FormTemplates xmlns="http://schemas.microsoft.com/sharepoint/v3/contenttype/forms">
+  <Display>DocumentLibraryForm</Display>
+  <Edit>DocumentLibraryForm</Edit>
+  <New>DocumentLibraryForm</New>
+</FormTemplates>
+</file>
+
 <file path=customXml/item3.xml><?xml version="1.0" encoding="utf-8"?>
 <p:properties xmlns:p="http://schemas.microsoft.com/office/2006/metadata/properties" xmlns:xsi="http://www.w3.org/2001/XMLSchema-instance" xmlns:pc="http://schemas.microsoft.com/office/infopath/2007/PartnerControls">
   <documentManagement/>
@@ -16236,14 +16323,6 @@
 </file>
 
 <file path=customXml/itemProps1.xml><?xml version="1.0" encoding="utf-8"?>
-<ds:datastoreItem xmlns:ds="http://schemas.openxmlformats.org/officeDocument/2006/customXml" ds:itemID="{012BA5D1-44B4-4C9F-A672-67DCBBFEC434}">
-  <ds:schemaRefs>
-    <ds:schemaRef ds:uri="http://schemas.microsoft.com/sharepoint/v3/contenttype/forms"/>
-  </ds:schemaRefs>
-</ds:datastoreItem>
-</file>
-
-<file path=customXml/itemProps2.xml><?xml version="1.0" encoding="utf-8"?>
 <ds:datastoreItem xmlns:ds="http://schemas.openxmlformats.org/officeDocument/2006/customXml" ds:itemID="{A74586BE-E8EA-47E3-AF58-58324FF0C251}">
   <ds:schemaRefs>
     <ds:schemaRef ds:uri="http://schemas.microsoft.com/office/2006/metadata/contentType"/>
@@ -16257,6 +16336,14 @@
     <ds:schemaRef ds:uri="http://purl.org/dc/elements/1.1/"/>
     <ds:schemaRef ds:uri="http://purl.org/dc/terms/"/>
     <ds:schemaRef ds:uri="http://schemas.microsoft.com/internal/obd"/>
+  </ds:schemaRefs>
+</ds:datastoreItem>
+</file>
+
+<file path=customXml/itemProps2.xml><?xml version="1.0" encoding="utf-8"?>
+<ds:datastoreItem xmlns:ds="http://schemas.openxmlformats.org/officeDocument/2006/customXml" ds:itemID="{012BA5D1-44B4-4C9F-A672-67DCBBFEC434}">
+  <ds:schemaRefs>
+    <ds:schemaRef ds:uri="http://schemas.microsoft.com/sharepoint/v3/contenttype/forms"/>
   </ds:schemaRefs>
 </ds:datastoreItem>
 </file>

</xml_diff>

<commit_message>
Testbench has been modified - 24bit test works properly
</commit_message>
<xml_diff>
--- a/Chip_controller.pptx
+++ b/Chip_controller.pptx
@@ -5,7 +5,7 @@
     <p:sldMasterId id="2147483648" r:id="rId4"/>
   </p:sldMasterIdLst>
   <p:notesMasterIdLst>
-    <p:notesMasterId r:id="rId28"/>
+    <p:notesMasterId r:id="rId30"/>
   </p:notesMasterIdLst>
   <p:sldIdLst>
     <p:sldId id="256" r:id="rId5"/>
@@ -31,6 +31,8 @@
     <p:sldId id="277" r:id="rId25"/>
     <p:sldId id="278" r:id="rId26"/>
     <p:sldId id="279" r:id="rId27"/>
+    <p:sldId id="280" r:id="rId28"/>
+    <p:sldId id="281" r:id="rId29"/>
   </p:sldIdLst>
   <p:sldSz cx="12192000" cy="6858000"/>
   <p:notesSz cx="6858000" cy="9144000"/>
@@ -3954,7 +3956,7 @@
           <a:p>
             <a:fld id="{501247CE-AEBE-4E28-B18F-884610CB35E9}" type="datetimeFigureOut">
               <a:rPr lang="pl-PL" smtClean="0"/>
-              <a:t>2023-10-29</a:t>
+              <a:t>2023-11-02</a:t>
             </a:fld>
             <a:endParaRPr lang="pl-PL"/>
           </a:p>
@@ -6142,7 +6144,7 @@
           <a:p>
             <a:fld id="{06177C7D-6CA5-4192-8F8D-E84608DE3E48}" type="datetimeFigureOut">
               <a:rPr lang="pl-PL" smtClean="0"/>
-              <a:t>2023-10-29</a:t>
+              <a:t>2023-11-02</a:t>
             </a:fld>
             <a:endParaRPr lang="pl-PL"/>
           </a:p>
@@ -6340,7 +6342,7 @@
           <a:p>
             <a:fld id="{06177C7D-6CA5-4192-8F8D-E84608DE3E48}" type="datetimeFigureOut">
               <a:rPr lang="pl-PL" smtClean="0"/>
-              <a:t>2023-10-29</a:t>
+              <a:t>2023-11-02</a:t>
             </a:fld>
             <a:endParaRPr lang="pl-PL"/>
           </a:p>
@@ -6548,7 +6550,7 @@
           <a:p>
             <a:fld id="{06177C7D-6CA5-4192-8F8D-E84608DE3E48}" type="datetimeFigureOut">
               <a:rPr lang="pl-PL" smtClean="0"/>
-              <a:t>2023-10-29</a:t>
+              <a:t>2023-11-02</a:t>
             </a:fld>
             <a:endParaRPr lang="pl-PL"/>
           </a:p>
@@ -6746,7 +6748,7 @@
           <a:p>
             <a:fld id="{06177C7D-6CA5-4192-8F8D-E84608DE3E48}" type="datetimeFigureOut">
               <a:rPr lang="pl-PL" smtClean="0"/>
-              <a:t>2023-10-29</a:t>
+              <a:t>2023-11-02</a:t>
             </a:fld>
             <a:endParaRPr lang="pl-PL"/>
           </a:p>
@@ -7021,7 +7023,7 @@
           <a:p>
             <a:fld id="{06177C7D-6CA5-4192-8F8D-E84608DE3E48}" type="datetimeFigureOut">
               <a:rPr lang="pl-PL" smtClean="0"/>
-              <a:t>2023-10-29</a:t>
+              <a:t>2023-11-02</a:t>
             </a:fld>
             <a:endParaRPr lang="pl-PL"/>
           </a:p>
@@ -7286,7 +7288,7 @@
           <a:p>
             <a:fld id="{06177C7D-6CA5-4192-8F8D-E84608DE3E48}" type="datetimeFigureOut">
               <a:rPr lang="pl-PL" smtClean="0"/>
-              <a:t>2023-10-29</a:t>
+              <a:t>2023-11-02</a:t>
             </a:fld>
             <a:endParaRPr lang="pl-PL"/>
           </a:p>
@@ -7698,7 +7700,7 @@
           <a:p>
             <a:fld id="{06177C7D-6CA5-4192-8F8D-E84608DE3E48}" type="datetimeFigureOut">
               <a:rPr lang="pl-PL" smtClean="0"/>
-              <a:t>2023-10-29</a:t>
+              <a:t>2023-11-02</a:t>
             </a:fld>
             <a:endParaRPr lang="pl-PL"/>
           </a:p>
@@ -7839,7 +7841,7 @@
           <a:p>
             <a:fld id="{06177C7D-6CA5-4192-8F8D-E84608DE3E48}" type="datetimeFigureOut">
               <a:rPr lang="pl-PL" smtClean="0"/>
-              <a:t>2023-10-29</a:t>
+              <a:t>2023-11-02</a:t>
             </a:fld>
             <a:endParaRPr lang="pl-PL"/>
           </a:p>
@@ -7952,7 +7954,7 @@
           <a:p>
             <a:fld id="{06177C7D-6CA5-4192-8F8D-E84608DE3E48}" type="datetimeFigureOut">
               <a:rPr lang="pl-PL" smtClean="0"/>
-              <a:t>2023-10-29</a:t>
+              <a:t>2023-11-02</a:t>
             </a:fld>
             <a:endParaRPr lang="pl-PL"/>
           </a:p>
@@ -8263,7 +8265,7 @@
           <a:p>
             <a:fld id="{06177C7D-6CA5-4192-8F8D-E84608DE3E48}" type="datetimeFigureOut">
               <a:rPr lang="pl-PL" smtClean="0"/>
-              <a:t>2023-10-29</a:t>
+              <a:t>2023-11-02</a:t>
             </a:fld>
             <a:endParaRPr lang="pl-PL"/>
           </a:p>
@@ -8551,7 +8553,7 @@
           <a:p>
             <a:fld id="{06177C7D-6CA5-4192-8F8D-E84608DE3E48}" type="datetimeFigureOut">
               <a:rPr lang="pl-PL" smtClean="0"/>
-              <a:t>2023-10-29</a:t>
+              <a:t>2023-11-02</a:t>
             </a:fld>
             <a:endParaRPr lang="pl-PL"/>
           </a:p>
@@ -8792,7 +8794,7 @@
           <a:p>
             <a:fld id="{06177C7D-6CA5-4192-8F8D-E84608DE3E48}" type="datetimeFigureOut">
               <a:rPr lang="pl-PL" smtClean="0"/>
-              <a:t>2023-10-29</a:t>
+              <a:t>2023-11-02</a:t>
             </a:fld>
             <a:endParaRPr lang="pl-PL"/>
           </a:p>
@@ -13517,6 +13519,318 @@
     <p:extLst>
       <p:ext uri="{BB962C8B-B14F-4D97-AF65-F5344CB8AC3E}">
         <p14:creationId xmlns:p14="http://schemas.microsoft.com/office/powerpoint/2010/main" val="1773146385"/>
+      </p:ext>
+    </p:extLst>
+  </p:cSld>
+  <p:clrMapOvr>
+    <a:masterClrMapping/>
+  </p:clrMapOvr>
+</p:sld>
+</file>
+
+<file path=ppt/slides/slide24.xml><?xml version="1.0" encoding="utf-8"?>
+<p:sld xmlns:a="http://schemas.openxmlformats.org/drawingml/2006/main" xmlns:r="http://schemas.openxmlformats.org/officeDocument/2006/relationships" xmlns:p="http://schemas.openxmlformats.org/presentationml/2006/main">
+  <p:cSld>
+    <p:spTree>
+      <p:nvGrpSpPr>
+        <p:cNvPr id="1" name=""/>
+        <p:cNvGrpSpPr/>
+        <p:nvPr/>
+      </p:nvGrpSpPr>
+      <p:grpSpPr>
+        <a:xfrm>
+          <a:off x="0" y="0"/>
+          <a:ext cx="0" cy="0"/>
+          <a:chOff x="0" y="0"/>
+          <a:chExt cx="0" cy="0"/>
+        </a:xfrm>
+      </p:grpSpPr>
+      <p:pic>
+        <p:nvPicPr>
+          <p:cNvPr id="4" name="Symbol zastępczy zawartości 4">
+            <a:extLst>
+              <a:ext uri="{FF2B5EF4-FFF2-40B4-BE49-F238E27FC236}">
+                <a16:creationId xmlns:a16="http://schemas.microsoft.com/office/drawing/2014/main" id="{34A02234-27EC-BB20-D1FF-02F99B30CFB2}"/>
+              </a:ext>
+            </a:extLst>
+          </p:cNvPr>
+          <p:cNvPicPr>
+            <a:picLocks noGrp="1" noChangeAspect="1"/>
+          </p:cNvPicPr>
+          <p:nvPr>
+            <p:ph idx="1"/>
+          </p:nvPr>
+        </p:nvPicPr>
+        <p:blipFill>
+          <a:blip r:embed="rId2"/>
+          <a:stretch>
+            <a:fillRect/>
+          </a:stretch>
+        </p:blipFill>
+        <p:spPr>
+          <a:xfrm>
+            <a:off x="208832" y="1790596"/>
+            <a:ext cx="4832355" cy="3276807"/>
+          </a:xfrm>
+        </p:spPr>
+      </p:pic>
+      <p:cxnSp>
+        <p:nvCxnSpPr>
+          <p:cNvPr id="6" name="Łącznik prosty ze strzałką 5">
+            <a:extLst>
+              <a:ext uri="{FF2B5EF4-FFF2-40B4-BE49-F238E27FC236}">
+                <a16:creationId xmlns:a16="http://schemas.microsoft.com/office/drawing/2014/main" id="{6A7EB532-A9E4-DECC-A9D0-82616E201326}"/>
+              </a:ext>
+            </a:extLst>
+          </p:cNvPr>
+          <p:cNvCxnSpPr/>
+          <p:nvPr/>
+        </p:nvCxnSpPr>
+        <p:spPr>
+          <a:xfrm>
+            <a:off x="4729941" y="3518216"/>
+            <a:ext cx="1753986" cy="0"/>
+          </a:xfrm>
+          <a:prstGeom prst="straightConnector1">
+            <a:avLst/>
+          </a:prstGeom>
+          <a:ln>
+            <a:tailEnd type="triangle"/>
+          </a:ln>
+        </p:spPr>
+        <p:style>
+          <a:lnRef idx="1">
+            <a:schemeClr val="accent1"/>
+          </a:lnRef>
+          <a:fillRef idx="0">
+            <a:schemeClr val="accent1"/>
+          </a:fillRef>
+          <a:effectRef idx="0">
+            <a:schemeClr val="accent1"/>
+          </a:effectRef>
+          <a:fontRef idx="minor">
+            <a:schemeClr val="tx1"/>
+          </a:fontRef>
+        </p:style>
+      </p:cxnSp>
+      <p:pic>
+        <p:nvPicPr>
+          <p:cNvPr id="8" name="Obraz 7">
+            <a:extLst>
+              <a:ext uri="{FF2B5EF4-FFF2-40B4-BE49-F238E27FC236}">
+                <a16:creationId xmlns:a16="http://schemas.microsoft.com/office/drawing/2014/main" id="{E006136A-9FE7-0F3A-478D-124CADA94E39}"/>
+              </a:ext>
+            </a:extLst>
+          </p:cNvPr>
+          <p:cNvPicPr>
+            <a:picLocks noChangeAspect="1"/>
+          </p:cNvPicPr>
+          <p:nvPr/>
+        </p:nvPicPr>
+        <p:blipFill>
+          <a:blip r:embed="rId3"/>
+          <a:stretch>
+            <a:fillRect/>
+          </a:stretch>
+        </p:blipFill>
+        <p:spPr>
+          <a:xfrm>
+            <a:off x="6483927" y="1724721"/>
+            <a:ext cx="5110758" cy="3342683"/>
+          </a:xfrm>
+          <a:prstGeom prst="rect">
+            <a:avLst/>
+          </a:prstGeom>
+        </p:spPr>
+      </p:pic>
+      <p:sp>
+        <p:nvSpPr>
+          <p:cNvPr id="9" name="Prostokąt 8">
+            <a:extLst>
+              <a:ext uri="{FF2B5EF4-FFF2-40B4-BE49-F238E27FC236}">
+                <a16:creationId xmlns:a16="http://schemas.microsoft.com/office/drawing/2014/main" id="{49055D9B-FBDE-F30A-917A-0EE2778F03FB}"/>
+              </a:ext>
+            </a:extLst>
+          </p:cNvPr>
+          <p:cNvSpPr/>
+          <p:nvPr/>
+        </p:nvSpPr>
+        <p:spPr>
+          <a:xfrm>
+            <a:off x="6724996" y="2227811"/>
+            <a:ext cx="839586" cy="465513"/>
+          </a:xfrm>
+          <a:prstGeom prst="rect">
+            <a:avLst/>
+          </a:prstGeom>
+          <a:noFill/>
+          <a:ln w="38100">
+            <a:solidFill>
+              <a:srgbClr val="FF0000"/>
+            </a:solidFill>
+          </a:ln>
+        </p:spPr>
+        <p:style>
+          <a:lnRef idx="2">
+            <a:schemeClr val="accent1">
+              <a:shade val="15000"/>
+            </a:schemeClr>
+          </a:lnRef>
+          <a:fillRef idx="1">
+            <a:schemeClr val="accent1"/>
+          </a:fillRef>
+          <a:effectRef idx="0">
+            <a:schemeClr val="accent1"/>
+          </a:effectRef>
+          <a:fontRef idx="minor">
+            <a:schemeClr val="lt1"/>
+          </a:fontRef>
+        </p:style>
+        <p:txBody>
+          <a:bodyPr rtlCol="0" anchor="ctr"/>
+          <a:lstStyle/>
+          <a:p>
+            <a:pPr algn="ctr"/>
+            <a:endParaRPr lang="pl-PL"/>
+          </a:p>
+        </p:txBody>
+      </p:sp>
+      <p:sp>
+        <p:nvSpPr>
+          <p:cNvPr id="10" name="Prostokąt 9">
+            <a:extLst>
+              <a:ext uri="{FF2B5EF4-FFF2-40B4-BE49-F238E27FC236}">
+                <a16:creationId xmlns:a16="http://schemas.microsoft.com/office/drawing/2014/main" id="{75308AA2-08B9-C080-2938-5C8D06629756}"/>
+              </a:ext>
+            </a:extLst>
+          </p:cNvPr>
+          <p:cNvSpPr/>
+          <p:nvPr/>
+        </p:nvSpPr>
+        <p:spPr>
+          <a:xfrm>
+            <a:off x="401781" y="2286000"/>
+            <a:ext cx="839586" cy="407324"/>
+          </a:xfrm>
+          <a:prstGeom prst="rect">
+            <a:avLst/>
+          </a:prstGeom>
+          <a:noFill/>
+          <a:ln w="38100">
+            <a:solidFill>
+              <a:srgbClr val="FF0000"/>
+            </a:solidFill>
+          </a:ln>
+        </p:spPr>
+        <p:style>
+          <a:lnRef idx="2">
+            <a:schemeClr val="accent1">
+              <a:shade val="15000"/>
+            </a:schemeClr>
+          </a:lnRef>
+          <a:fillRef idx="1">
+            <a:schemeClr val="accent1"/>
+          </a:fillRef>
+          <a:effectRef idx="0">
+            <a:schemeClr val="accent1"/>
+          </a:effectRef>
+          <a:fontRef idx="minor">
+            <a:schemeClr val="lt1"/>
+          </a:fontRef>
+        </p:style>
+        <p:txBody>
+          <a:bodyPr rtlCol="0" anchor="ctr"/>
+          <a:lstStyle/>
+          <a:p>
+            <a:pPr algn="ctr"/>
+            <a:endParaRPr lang="pl-PL"/>
+          </a:p>
+        </p:txBody>
+      </p:sp>
+    </p:spTree>
+    <p:extLst>
+      <p:ext uri="{BB962C8B-B14F-4D97-AF65-F5344CB8AC3E}">
+        <p14:creationId xmlns:p14="http://schemas.microsoft.com/office/powerpoint/2010/main" val="3149416619"/>
+      </p:ext>
+    </p:extLst>
+  </p:cSld>
+  <p:clrMapOvr>
+    <a:masterClrMapping/>
+  </p:clrMapOvr>
+</p:sld>
+</file>
+
+<file path=ppt/slides/slide25.xml><?xml version="1.0" encoding="utf-8"?>
+<p:sld xmlns:a="http://schemas.openxmlformats.org/drawingml/2006/main" xmlns:r="http://schemas.openxmlformats.org/officeDocument/2006/relationships" xmlns:p="http://schemas.openxmlformats.org/presentationml/2006/main">
+  <p:cSld>
+    <p:spTree>
+      <p:nvGrpSpPr>
+        <p:cNvPr id="1" name=""/>
+        <p:cNvGrpSpPr/>
+        <p:nvPr/>
+      </p:nvGrpSpPr>
+      <p:grpSpPr>
+        <a:xfrm>
+          <a:off x="0" y="0"/>
+          <a:ext cx="0" cy="0"/>
+          <a:chOff x="0" y="0"/>
+          <a:chExt cx="0" cy="0"/>
+        </a:xfrm>
+      </p:grpSpPr>
+      <p:sp>
+        <p:nvSpPr>
+          <p:cNvPr id="2" name="Tytuł 1">
+            <a:extLst>
+              <a:ext uri="{FF2B5EF4-FFF2-40B4-BE49-F238E27FC236}">
+                <a16:creationId xmlns:a16="http://schemas.microsoft.com/office/drawing/2014/main" id="{A17CA7C4-2453-8697-86BC-63612DE4722F}"/>
+              </a:ext>
+            </a:extLst>
+          </p:cNvPr>
+          <p:cNvSpPr>
+            <a:spLocks noGrp="1"/>
+          </p:cNvSpPr>
+          <p:nvPr>
+            <p:ph type="title"/>
+          </p:nvPr>
+        </p:nvSpPr>
+        <p:spPr/>
+        <p:txBody>
+          <a:bodyPr/>
+          <a:lstStyle/>
+          <a:p>
+            <a:endParaRPr lang="pl-PL"/>
+          </a:p>
+        </p:txBody>
+      </p:sp>
+      <p:sp>
+        <p:nvSpPr>
+          <p:cNvPr id="3" name="Symbol zastępczy zawartości 2">
+            <a:extLst>
+              <a:ext uri="{FF2B5EF4-FFF2-40B4-BE49-F238E27FC236}">
+                <a16:creationId xmlns:a16="http://schemas.microsoft.com/office/drawing/2014/main" id="{D802092D-1D0E-EDFA-8192-1D1DDCD53FEA}"/>
+              </a:ext>
+            </a:extLst>
+          </p:cNvPr>
+          <p:cNvSpPr>
+            <a:spLocks noGrp="1"/>
+          </p:cNvSpPr>
+          <p:nvPr>
+            <p:ph idx="1"/>
+          </p:nvPr>
+        </p:nvSpPr>
+        <p:spPr/>
+        <p:txBody>
+          <a:bodyPr/>
+          <a:lstStyle/>
+          <a:p>
+            <a:endParaRPr lang="pl-PL"/>
+          </a:p>
+        </p:txBody>
+      </p:sp>
+    </p:spTree>
+    <p:extLst>
+      <p:ext uri="{BB962C8B-B14F-4D97-AF65-F5344CB8AC3E}">
+        <p14:creationId xmlns:p14="http://schemas.microsoft.com/office/powerpoint/2010/main" val="3466620043"/>
       </p:ext>
     </p:extLst>
   </p:cSld>
@@ -16170,6 +16484,15 @@
 </file>
 
 <file path=customXml/item1.xml><?xml version="1.0" encoding="utf-8"?>
+<?mso-contentType ?>
+<FormTemplates xmlns="http://schemas.microsoft.com/sharepoint/v3/contenttype/forms">
+  <Display>DocumentLibraryForm</Display>
+  <Edit>DocumentLibraryForm</Edit>
+  <New>DocumentLibraryForm</New>
+</FormTemplates>
+</file>
+
+<file path=customXml/item2.xml><?xml version="1.0" encoding="utf-8"?>
 <ct:contentTypeSchema xmlns:ct="http://schemas.microsoft.com/office/2006/metadata/contentType" xmlns:ma="http://schemas.microsoft.com/office/2006/metadata/properties/metaAttributes" ct:_="" ma:_="" ma:contentTypeName="Dokument" ma:contentTypeID="0x010100769EEAFFF8050846B8921DC5A70925A7" ma:contentTypeVersion="3" ma:contentTypeDescription="Utwórz nowy dokument." ma:contentTypeScope="" ma:versionID="1f4082ff9506847b40a5a59f069eab22">
   <xsd:schema xmlns:xsd="http://www.w3.org/2001/XMLSchema" xmlns:xs="http://www.w3.org/2001/XMLSchema" xmlns:p="http://schemas.microsoft.com/office/2006/metadata/properties" xmlns:ns2="8f53f1b7-a1b3-4c57-bf3a-36b8131d8963" targetNamespace="http://schemas.microsoft.com/office/2006/metadata/properties" ma:root="true" ma:fieldsID="d189dd818bdf0938f0b5cbdf1b3b47c0" ns2:_="">
     <xsd:import namespace="8f53f1b7-a1b3-4c57-bf3a-36b8131d8963"/>
@@ -16307,15 +16630,6 @@
 </ct:contentTypeSchema>
 </file>
 
-<file path=customXml/item2.xml><?xml version="1.0" encoding="utf-8"?>
-<?mso-contentType ?>
-<FormTemplates xmlns="http://schemas.microsoft.com/sharepoint/v3/contenttype/forms">
-  <Display>DocumentLibraryForm</Display>
-  <Edit>DocumentLibraryForm</Edit>
-  <New>DocumentLibraryForm</New>
-</FormTemplates>
-</file>
-
 <file path=customXml/item3.xml><?xml version="1.0" encoding="utf-8"?>
 <p:properties xmlns:p="http://schemas.microsoft.com/office/2006/metadata/properties" xmlns:xsi="http://www.w3.org/2001/XMLSchema-instance" xmlns:pc="http://schemas.microsoft.com/office/infopath/2007/PartnerControls">
   <documentManagement/>
@@ -16323,6 +16637,14 @@
 </file>
 
 <file path=customXml/itemProps1.xml><?xml version="1.0" encoding="utf-8"?>
+<ds:datastoreItem xmlns:ds="http://schemas.openxmlformats.org/officeDocument/2006/customXml" ds:itemID="{012BA5D1-44B4-4C9F-A672-67DCBBFEC434}">
+  <ds:schemaRefs>
+    <ds:schemaRef ds:uri="http://schemas.microsoft.com/sharepoint/v3/contenttype/forms"/>
+  </ds:schemaRefs>
+</ds:datastoreItem>
+</file>
+
+<file path=customXml/itemProps2.xml><?xml version="1.0" encoding="utf-8"?>
 <ds:datastoreItem xmlns:ds="http://schemas.openxmlformats.org/officeDocument/2006/customXml" ds:itemID="{A74586BE-E8EA-47E3-AF58-58324FF0C251}">
   <ds:schemaRefs>
     <ds:schemaRef ds:uri="http://schemas.microsoft.com/office/2006/metadata/contentType"/>
@@ -16336,14 +16658,6 @@
     <ds:schemaRef ds:uri="http://purl.org/dc/elements/1.1/"/>
     <ds:schemaRef ds:uri="http://purl.org/dc/terms/"/>
     <ds:schemaRef ds:uri="http://schemas.microsoft.com/internal/obd"/>
-  </ds:schemaRefs>
-</ds:datastoreItem>
-</file>
-
-<file path=customXml/itemProps2.xml><?xml version="1.0" encoding="utf-8"?>
-<ds:datastoreItem xmlns:ds="http://schemas.openxmlformats.org/officeDocument/2006/customXml" ds:itemID="{012BA5D1-44B4-4C9F-A672-67DCBBFEC434}">
-  <ds:schemaRefs>
-    <ds:schemaRef ds:uri="http://schemas.microsoft.com/sharepoint/v3/contenttype/forms"/>
   </ds:schemaRefs>
 </ds:datastoreItem>
 </file>

</xml_diff>